<commit_message>
I am keeping a linear model for the soil water content along the soil profile. I prepared the outputs and figures for that, and I modified the main file.
</commit_message>
<xml_diff>
--- a/figures/conceptual_model.pptx
+++ b/figures/conceptual_model.pptx
@@ -3349,10 +3349,10 @@
       </p:grpSpPr>
       <p:grpSp>
         <p:nvGrpSpPr>
-          <p:cNvPr id="175" name="Grupo 174">
+          <p:cNvPr id="56" name="Grupo 55">
             <a:extLst>
               <a:ext uri="{FF2B5EF4-FFF2-40B4-BE49-F238E27FC236}">
-                <a16:creationId xmlns:a16="http://schemas.microsoft.com/office/drawing/2014/main" id="{F73A7688-EE6F-B0D5-5E82-3FD967A939C3}"/>
+                <a16:creationId xmlns:a16="http://schemas.microsoft.com/office/drawing/2014/main" id="{52840E3A-EE11-338C-FE27-B2AC8AB5F882}"/>
               </a:ext>
             </a:extLst>
           </p:cNvPr>
@@ -5335,102 +5335,6 @@
                   <a:cs typeface="Arial" panose="020B0604020202020204" pitchFamily="34" charset="0"/>
                 </a:rPr>
                 <a:t>soil water</a:t>
-              </a:r>
-              <a:endParaRPr lang="es-PE" sz="1600" dirty="0">
-                <a:latin typeface="Arial" panose="020B0604020202020204" pitchFamily="34" charset="0"/>
-                <a:cs typeface="Arial" panose="020B0604020202020204" pitchFamily="34" charset="0"/>
-              </a:endParaRPr>
-            </a:p>
-          </p:txBody>
-        </p:sp>
-        <p:sp>
-          <p:nvSpPr>
-            <p:cNvPr id="67" name="Rectángulo 66">
-              <a:extLst>
-                <a:ext uri="{FF2B5EF4-FFF2-40B4-BE49-F238E27FC236}">
-                  <a16:creationId xmlns:a16="http://schemas.microsoft.com/office/drawing/2014/main" id="{6473C498-B765-ADEA-1E34-855A0D1528A9}"/>
-                </a:ext>
-              </a:extLst>
-            </p:cNvPr>
-            <p:cNvSpPr/>
-            <p:nvPr/>
-          </p:nvSpPr>
-          <p:spPr>
-            <a:xfrm>
-              <a:off x="8552461" y="3959374"/>
-              <a:ext cx="2891208" cy="2138782"/>
-            </a:xfrm>
-            <a:prstGeom prst="rect">
-              <a:avLst/>
-            </a:prstGeom>
-            <a:solidFill>
-              <a:srgbClr val="4472C4">
-                <a:alpha val="50196"/>
-              </a:srgbClr>
-            </a:solidFill>
-            <a:ln>
-              <a:noFill/>
-            </a:ln>
-          </p:spPr>
-          <p:style>
-            <a:lnRef idx="2">
-              <a:schemeClr val="accent1">
-                <a:shade val="50000"/>
-              </a:schemeClr>
-            </a:lnRef>
-            <a:fillRef idx="1">
-              <a:schemeClr val="accent1"/>
-            </a:fillRef>
-            <a:effectRef idx="0">
-              <a:schemeClr val="accent1"/>
-            </a:effectRef>
-            <a:fontRef idx="minor">
-              <a:schemeClr val="lt1"/>
-            </a:fontRef>
-          </p:style>
-          <p:txBody>
-            <a:bodyPr rtlCol="0" anchor="ctr"/>
-            <a:lstStyle/>
-            <a:p>
-              <a:pPr algn="ctr"/>
-              <a:endParaRPr lang="es-PE"/>
-            </a:p>
-          </p:txBody>
-        </p:sp>
-        <p:sp>
-          <p:nvSpPr>
-            <p:cNvPr id="66" name="CuadroTexto 65">
-              <a:extLst>
-                <a:ext uri="{FF2B5EF4-FFF2-40B4-BE49-F238E27FC236}">
-                  <a16:creationId xmlns:a16="http://schemas.microsoft.com/office/drawing/2014/main" id="{906A9A8B-01BC-1A46-C789-8C30909212F2}"/>
-                </a:ext>
-              </a:extLst>
-            </p:cNvPr>
-            <p:cNvSpPr txBox="1"/>
-            <p:nvPr/>
-          </p:nvSpPr>
-          <p:spPr>
-            <a:xfrm>
-              <a:off x="8625208" y="4877204"/>
-              <a:ext cx="1928733" cy="338554"/>
-            </a:xfrm>
-            <a:prstGeom prst="rect">
-              <a:avLst/>
-            </a:prstGeom>
-            <a:noFill/>
-          </p:spPr>
-          <p:txBody>
-            <a:bodyPr wrap="none" rtlCol="0">
-              <a:spAutoFit/>
-            </a:bodyPr>
-            <a:lstStyle/>
-            <a:p>
-              <a:r>
-                <a:rPr lang="de-DE" sz="1600" dirty="0">
-                  <a:latin typeface="Arial" panose="020B0604020202020204" pitchFamily="34" charset="0"/>
-                  <a:cs typeface="Arial" panose="020B0604020202020204" pitchFamily="34" charset="0"/>
-                </a:rPr>
-                <a:t>constant soil water</a:t>
               </a:r>
               <a:endParaRPr lang="es-PE" sz="1600" dirty="0">
                 <a:latin typeface="Arial" panose="020B0604020202020204" pitchFamily="34" charset="0"/>
@@ -10403,62 +10307,6 @@
             </a:p>
           </p:txBody>
         </p:sp>
-        <p:sp>
-          <p:nvSpPr>
-            <p:cNvPr id="11" name="Flecha: hacia abajo 10">
-              <a:extLst>
-                <a:ext uri="{FF2B5EF4-FFF2-40B4-BE49-F238E27FC236}">
-                  <a16:creationId xmlns:a16="http://schemas.microsoft.com/office/drawing/2014/main" id="{B01AECE3-3F69-493A-A877-436305D21757}"/>
-                </a:ext>
-              </a:extLst>
-            </p:cNvPr>
-            <p:cNvSpPr/>
-            <p:nvPr/>
-          </p:nvSpPr>
-          <p:spPr>
-            <a:xfrm flipV="1">
-              <a:off x="9587609" y="3580177"/>
-              <a:ext cx="161261" cy="192522"/>
-            </a:xfrm>
-            <a:prstGeom prst="downArrow">
-              <a:avLst/>
-            </a:prstGeom>
-            <a:solidFill>
-              <a:srgbClr val="00B050"/>
-            </a:solidFill>
-            <a:ln>
-              <a:solidFill>
-                <a:schemeClr val="accent6">
-                  <a:lumMod val="75000"/>
-                </a:schemeClr>
-              </a:solidFill>
-            </a:ln>
-          </p:spPr>
-          <p:style>
-            <a:lnRef idx="2">
-              <a:schemeClr val="accent1">
-                <a:shade val="50000"/>
-              </a:schemeClr>
-            </a:lnRef>
-            <a:fillRef idx="1">
-              <a:schemeClr val="accent1"/>
-            </a:fillRef>
-            <a:effectRef idx="0">
-              <a:schemeClr val="accent1"/>
-            </a:effectRef>
-            <a:fontRef idx="minor">
-              <a:schemeClr val="lt1"/>
-            </a:fontRef>
-          </p:style>
-          <p:txBody>
-            <a:bodyPr rtlCol="0" anchor="ctr"/>
-            <a:lstStyle/>
-            <a:p>
-              <a:pPr algn="ctr"/>
-              <a:endParaRPr lang="en-US"/>
-            </a:p>
-          </p:txBody>
-        </p:sp>
         <p:cxnSp>
           <p:nvCxnSpPr>
             <p:cNvPr id="15" name="Conector recto de flecha 14">
@@ -10670,60 +10518,6 @@
         </p:sp>
         <p:sp>
           <p:nvSpPr>
-            <p:cNvPr id="31" name="Flecha: hacia abajo 30">
-              <a:extLst>
-                <a:ext uri="{FF2B5EF4-FFF2-40B4-BE49-F238E27FC236}">
-                  <a16:creationId xmlns:a16="http://schemas.microsoft.com/office/drawing/2014/main" id="{3D70B833-B82F-9936-3B56-6948DB1DD7A0}"/>
-                </a:ext>
-              </a:extLst>
-            </p:cNvPr>
-            <p:cNvSpPr/>
-            <p:nvPr/>
-          </p:nvSpPr>
-          <p:spPr>
-            <a:xfrm>
-              <a:off x="7410454" y="2733548"/>
-              <a:ext cx="161261" cy="192522"/>
-            </a:xfrm>
-            <a:prstGeom prst="downArrow">
-              <a:avLst/>
-            </a:prstGeom>
-            <a:solidFill>
-              <a:srgbClr val="FF0000"/>
-            </a:solidFill>
-            <a:ln>
-              <a:solidFill>
-                <a:srgbClr val="C00000"/>
-              </a:solidFill>
-            </a:ln>
-          </p:spPr>
-          <p:style>
-            <a:lnRef idx="2">
-              <a:schemeClr val="accent1">
-                <a:shade val="50000"/>
-              </a:schemeClr>
-            </a:lnRef>
-            <a:fillRef idx="1">
-              <a:schemeClr val="accent1"/>
-            </a:fillRef>
-            <a:effectRef idx="0">
-              <a:schemeClr val="accent1"/>
-            </a:effectRef>
-            <a:fontRef idx="minor">
-              <a:schemeClr val="lt1"/>
-            </a:fontRef>
-          </p:style>
-          <p:txBody>
-            <a:bodyPr rtlCol="0" anchor="ctr"/>
-            <a:lstStyle/>
-            <a:p>
-              <a:pPr algn="ctr"/>
-              <a:endParaRPr lang="en-US"/>
-            </a:p>
-          </p:txBody>
-        </p:sp>
-        <p:sp>
-          <p:nvSpPr>
             <p:cNvPr id="32" name="Flecha: hacia abajo 31">
               <a:extLst>
                 <a:ext uri="{FF2B5EF4-FFF2-40B4-BE49-F238E27FC236}">
@@ -10793,60 +10587,6 @@
           <p:spPr>
             <a:xfrm>
               <a:off x="3438347" y="2714593"/>
-              <a:ext cx="161261" cy="192522"/>
-            </a:xfrm>
-            <a:prstGeom prst="downArrow">
-              <a:avLst/>
-            </a:prstGeom>
-            <a:solidFill>
-              <a:srgbClr val="FF0000"/>
-            </a:solidFill>
-            <a:ln>
-              <a:solidFill>
-                <a:srgbClr val="C00000"/>
-              </a:solidFill>
-            </a:ln>
-          </p:spPr>
-          <p:style>
-            <a:lnRef idx="2">
-              <a:schemeClr val="accent1">
-                <a:shade val="50000"/>
-              </a:schemeClr>
-            </a:lnRef>
-            <a:fillRef idx="1">
-              <a:schemeClr val="accent1"/>
-            </a:fillRef>
-            <a:effectRef idx="0">
-              <a:schemeClr val="accent1"/>
-            </a:effectRef>
-            <a:fontRef idx="minor">
-              <a:schemeClr val="lt1"/>
-            </a:fontRef>
-          </p:style>
-          <p:txBody>
-            <a:bodyPr rtlCol="0" anchor="ctr"/>
-            <a:lstStyle/>
-            <a:p>
-              <a:pPr algn="ctr"/>
-              <a:endParaRPr lang="en-US"/>
-            </a:p>
-          </p:txBody>
-        </p:sp>
-        <p:sp>
-          <p:nvSpPr>
-            <p:cNvPr id="34" name="Flecha: hacia abajo 33">
-              <a:extLst>
-                <a:ext uri="{FF2B5EF4-FFF2-40B4-BE49-F238E27FC236}">
-                  <a16:creationId xmlns:a16="http://schemas.microsoft.com/office/drawing/2014/main" id="{D32B022F-5D64-4B29-434F-AE942DC2745E}"/>
-                </a:ext>
-              </a:extLst>
-            </p:cNvPr>
-            <p:cNvSpPr/>
-            <p:nvPr/>
-          </p:nvSpPr>
-          <p:spPr>
-            <a:xfrm>
-              <a:off x="7373390" y="3578782"/>
               <a:ext cx="161261" cy="192522"/>
             </a:xfrm>
             <a:prstGeom prst="downArrow">
@@ -11061,7 +10801,7 @@
             <a:noFill/>
           </p:spPr>
           <p:txBody>
-            <a:bodyPr wrap="none" rtlCol="0">
+            <a:bodyPr wrap="square" rtlCol="0">
               <a:spAutoFit/>
             </a:bodyPr>
             <a:lstStyle/>
@@ -11663,7 +11403,7 @@
             <a:noFill/>
           </p:spPr>
           <p:txBody>
-            <a:bodyPr wrap="none" rtlCol="0">
+            <a:bodyPr wrap="square" rtlCol="0">
               <a:spAutoFit/>
             </a:bodyPr>
             <a:lstStyle/>
@@ -11699,7 +11439,7 @@
           <p:spPr>
             <a:xfrm>
               <a:off x="1439508" y="3952240"/>
-              <a:ext cx="7112953" cy="0"/>
+              <a:ext cx="9974853" cy="0"/>
             </a:xfrm>
             <a:prstGeom prst="line">
               <a:avLst/>
@@ -11740,13 +11480,15 @@
                 </a:ext>
               </a:extLst>
             </p:cNvPr>
-            <p:cNvCxnSpPr/>
+            <p:cNvCxnSpPr>
+              <a:cxnSpLocks/>
+            </p:cNvCxnSpPr>
             <p:nvPr/>
           </p:nvCxnSpPr>
           <p:spPr>
             <a:xfrm>
               <a:off x="1439508" y="5054837"/>
-              <a:ext cx="7112953" cy="0"/>
+              <a:ext cx="10005102" cy="0"/>
             </a:xfrm>
             <a:prstGeom prst="line">
               <a:avLst/>
@@ -11903,6 +11645,366 @@
           <p:spPr>
             <a:xfrm>
               <a:off x="2447199" y="5311181"/>
+              <a:ext cx="161261" cy="192522"/>
+            </a:xfrm>
+            <a:prstGeom prst="downArrow">
+              <a:avLst/>
+            </a:prstGeom>
+            <a:solidFill>
+              <a:srgbClr val="FF0000"/>
+            </a:solidFill>
+            <a:ln>
+              <a:solidFill>
+                <a:srgbClr val="C00000"/>
+              </a:solidFill>
+            </a:ln>
+          </p:spPr>
+          <p:style>
+            <a:lnRef idx="2">
+              <a:schemeClr val="accent1">
+                <a:shade val="50000"/>
+              </a:schemeClr>
+            </a:lnRef>
+            <a:fillRef idx="1">
+              <a:schemeClr val="accent1"/>
+            </a:fillRef>
+            <a:effectRef idx="0">
+              <a:schemeClr val="accent1"/>
+            </a:effectRef>
+            <a:fontRef idx="minor">
+              <a:schemeClr val="lt1"/>
+            </a:fontRef>
+          </p:style>
+          <p:txBody>
+            <a:bodyPr rtlCol="0" anchor="ctr"/>
+            <a:lstStyle/>
+            <a:p>
+              <a:pPr algn="ctr"/>
+              <a:endParaRPr lang="en-US"/>
+            </a:p>
+          </p:txBody>
+        </p:sp>
+        <p:sp>
+          <p:nvSpPr>
+            <p:cNvPr id="2" name="Flecha: hacia abajo 1">
+              <a:extLst>
+                <a:ext uri="{FF2B5EF4-FFF2-40B4-BE49-F238E27FC236}">
+                  <a16:creationId xmlns:a16="http://schemas.microsoft.com/office/drawing/2014/main" id="{6223687B-D772-BB61-A7A8-337FBE06F7D1}"/>
+                </a:ext>
+              </a:extLst>
+            </p:cNvPr>
+            <p:cNvSpPr/>
+            <p:nvPr/>
+          </p:nvSpPr>
+          <p:spPr>
+            <a:xfrm>
+              <a:off x="9607863" y="3605153"/>
+              <a:ext cx="161261" cy="192522"/>
+            </a:xfrm>
+            <a:prstGeom prst="downArrow">
+              <a:avLst/>
+            </a:prstGeom>
+            <a:solidFill>
+              <a:srgbClr val="FF0000"/>
+            </a:solidFill>
+            <a:ln>
+              <a:solidFill>
+                <a:srgbClr val="C00000"/>
+              </a:solidFill>
+            </a:ln>
+          </p:spPr>
+          <p:style>
+            <a:lnRef idx="2">
+              <a:schemeClr val="accent1">
+                <a:shade val="50000"/>
+              </a:schemeClr>
+            </a:lnRef>
+            <a:fillRef idx="1">
+              <a:schemeClr val="accent1"/>
+            </a:fillRef>
+            <a:effectRef idx="0">
+              <a:schemeClr val="accent1"/>
+            </a:effectRef>
+            <a:fontRef idx="minor">
+              <a:schemeClr val="lt1"/>
+            </a:fontRef>
+          </p:style>
+          <p:txBody>
+            <a:bodyPr rtlCol="0" anchor="ctr"/>
+            <a:lstStyle/>
+            <a:p>
+              <a:pPr algn="ctr"/>
+              <a:endParaRPr lang="en-US"/>
+            </a:p>
+          </p:txBody>
+        </p:sp>
+        <p:sp>
+          <p:nvSpPr>
+            <p:cNvPr id="4" name="Flecha: hacia abajo 3">
+              <a:extLst>
+                <a:ext uri="{FF2B5EF4-FFF2-40B4-BE49-F238E27FC236}">
+                  <a16:creationId xmlns:a16="http://schemas.microsoft.com/office/drawing/2014/main" id="{0F492B6D-C72C-AA5A-F211-41170DE1D33D}"/>
+                </a:ext>
+              </a:extLst>
+            </p:cNvPr>
+            <p:cNvSpPr/>
+            <p:nvPr/>
+          </p:nvSpPr>
+          <p:spPr>
+            <a:xfrm flipV="1">
+              <a:off x="7431953" y="2726931"/>
+              <a:ext cx="161261" cy="192522"/>
+            </a:xfrm>
+            <a:prstGeom prst="downArrow">
+              <a:avLst/>
+            </a:prstGeom>
+            <a:solidFill>
+              <a:srgbClr val="00B050"/>
+            </a:solidFill>
+            <a:ln>
+              <a:solidFill>
+                <a:schemeClr val="accent6">
+                  <a:lumMod val="75000"/>
+                </a:schemeClr>
+              </a:solidFill>
+            </a:ln>
+          </p:spPr>
+          <p:style>
+            <a:lnRef idx="2">
+              <a:schemeClr val="accent1">
+                <a:shade val="50000"/>
+              </a:schemeClr>
+            </a:lnRef>
+            <a:fillRef idx="1">
+              <a:schemeClr val="accent1"/>
+            </a:fillRef>
+            <a:effectRef idx="0">
+              <a:schemeClr val="accent1"/>
+            </a:effectRef>
+            <a:fontRef idx="minor">
+              <a:schemeClr val="lt1"/>
+            </a:fontRef>
+          </p:style>
+          <p:txBody>
+            <a:bodyPr rtlCol="0" anchor="ctr"/>
+            <a:lstStyle/>
+            <a:p>
+              <a:pPr algn="ctr"/>
+              <a:endParaRPr lang="en-US"/>
+            </a:p>
+          </p:txBody>
+        </p:sp>
+        <p:sp>
+          <p:nvSpPr>
+            <p:cNvPr id="14" name="Flecha: hacia abajo 13">
+              <a:extLst>
+                <a:ext uri="{FF2B5EF4-FFF2-40B4-BE49-F238E27FC236}">
+                  <a16:creationId xmlns:a16="http://schemas.microsoft.com/office/drawing/2014/main" id="{36DBCA91-6799-665A-54D3-D9C1DC1A77E7}"/>
+                </a:ext>
+              </a:extLst>
+            </p:cNvPr>
+            <p:cNvSpPr/>
+            <p:nvPr/>
+          </p:nvSpPr>
+          <p:spPr>
+            <a:xfrm flipV="1">
+              <a:off x="7370323" y="3571133"/>
+              <a:ext cx="161261" cy="192522"/>
+            </a:xfrm>
+            <a:prstGeom prst="downArrow">
+              <a:avLst/>
+            </a:prstGeom>
+            <a:solidFill>
+              <a:srgbClr val="00B050"/>
+            </a:solidFill>
+            <a:ln>
+              <a:solidFill>
+                <a:schemeClr val="accent6">
+                  <a:lumMod val="75000"/>
+                </a:schemeClr>
+              </a:solidFill>
+            </a:ln>
+          </p:spPr>
+          <p:style>
+            <a:lnRef idx="2">
+              <a:schemeClr val="accent1">
+                <a:shade val="50000"/>
+              </a:schemeClr>
+            </a:lnRef>
+            <a:fillRef idx="1">
+              <a:schemeClr val="accent1"/>
+            </a:fillRef>
+            <a:effectRef idx="0">
+              <a:schemeClr val="accent1"/>
+            </a:effectRef>
+            <a:fontRef idx="minor">
+              <a:schemeClr val="lt1"/>
+            </a:fontRef>
+          </p:style>
+          <p:txBody>
+            <a:bodyPr rtlCol="0" anchor="ctr"/>
+            <a:lstStyle/>
+            <a:p>
+              <a:pPr algn="ctr"/>
+              <a:endParaRPr lang="en-US"/>
+            </a:p>
+          </p:txBody>
+        </p:sp>
+        <p:sp>
+          <p:nvSpPr>
+            <p:cNvPr id="16" name="CuadroTexto 15">
+              <a:extLst>
+                <a:ext uri="{FF2B5EF4-FFF2-40B4-BE49-F238E27FC236}">
+                  <a16:creationId xmlns:a16="http://schemas.microsoft.com/office/drawing/2014/main" id="{0D7F765B-3903-FFB6-15D8-8DC834811931}"/>
+                </a:ext>
+              </a:extLst>
+            </p:cNvPr>
+            <p:cNvSpPr txBox="1"/>
+            <p:nvPr/>
+          </p:nvSpPr>
+          <p:spPr>
+            <a:xfrm>
+              <a:off x="8629809" y="5245897"/>
+              <a:ext cx="1083951" cy="338554"/>
+            </a:xfrm>
+            <a:prstGeom prst="rect">
+              <a:avLst/>
+            </a:prstGeom>
+            <a:noFill/>
+          </p:spPr>
+          <p:txBody>
+            <a:bodyPr wrap="square" rtlCol="0">
+              <a:spAutoFit/>
+            </a:bodyPr>
+            <a:lstStyle/>
+            <a:p>
+              <a:r>
+                <a:rPr lang="de-DE" sz="1600" dirty="0">
+                  <a:latin typeface="Arial" panose="020B0604020202020204" pitchFamily="34" charset="0"/>
+                  <a:cs typeface="Arial" panose="020B0604020202020204" pitchFamily="34" charset="0"/>
+                </a:rPr>
+                <a:t>soil water</a:t>
+              </a:r>
+              <a:endParaRPr lang="es-PE" sz="1600" dirty="0">
+                <a:latin typeface="Arial" panose="020B0604020202020204" pitchFamily="34" charset="0"/>
+                <a:cs typeface="Arial" panose="020B0604020202020204" pitchFamily="34" charset="0"/>
+              </a:endParaRPr>
+            </a:p>
+          </p:txBody>
+        </p:sp>
+        <p:sp>
+          <p:nvSpPr>
+            <p:cNvPr id="17" name="CuadroTexto 16">
+              <a:extLst>
+                <a:ext uri="{FF2B5EF4-FFF2-40B4-BE49-F238E27FC236}">
+                  <a16:creationId xmlns:a16="http://schemas.microsoft.com/office/drawing/2014/main" id="{099380C2-2624-3534-46B0-D8C0317742A6}"/>
+                </a:ext>
+              </a:extLst>
+            </p:cNvPr>
+            <p:cNvSpPr txBox="1"/>
+            <p:nvPr/>
+          </p:nvSpPr>
+          <p:spPr>
+            <a:xfrm>
+              <a:off x="8637919" y="4295566"/>
+              <a:ext cx="1083951" cy="338554"/>
+            </a:xfrm>
+            <a:prstGeom prst="rect">
+              <a:avLst/>
+            </a:prstGeom>
+            <a:noFill/>
+          </p:spPr>
+          <p:txBody>
+            <a:bodyPr wrap="square" rtlCol="0">
+              <a:spAutoFit/>
+            </a:bodyPr>
+            <a:lstStyle/>
+            <a:p>
+              <a:r>
+                <a:rPr lang="de-DE" sz="1600" dirty="0">
+                  <a:latin typeface="Arial" panose="020B0604020202020204" pitchFamily="34" charset="0"/>
+                  <a:cs typeface="Arial" panose="020B0604020202020204" pitchFamily="34" charset="0"/>
+                </a:rPr>
+                <a:t>soil water</a:t>
+              </a:r>
+              <a:endParaRPr lang="es-PE" sz="1600" dirty="0">
+                <a:latin typeface="Arial" panose="020B0604020202020204" pitchFamily="34" charset="0"/>
+                <a:cs typeface="Arial" panose="020B0604020202020204" pitchFamily="34" charset="0"/>
+              </a:endParaRPr>
+            </a:p>
+          </p:txBody>
+        </p:sp>
+        <p:sp>
+          <p:nvSpPr>
+            <p:cNvPr id="18" name="Flecha: hacia abajo 17">
+              <a:extLst>
+                <a:ext uri="{FF2B5EF4-FFF2-40B4-BE49-F238E27FC236}">
+                  <a16:creationId xmlns:a16="http://schemas.microsoft.com/office/drawing/2014/main" id="{9D89BD7F-74B8-7140-5716-3E95EB80AFB6}"/>
+                </a:ext>
+              </a:extLst>
+            </p:cNvPr>
+            <p:cNvSpPr/>
+            <p:nvPr/>
+          </p:nvSpPr>
+          <p:spPr>
+            <a:xfrm flipV="1">
+              <a:off x="9648781" y="4371828"/>
+              <a:ext cx="161261" cy="192522"/>
+            </a:xfrm>
+            <a:prstGeom prst="downArrow">
+              <a:avLst/>
+            </a:prstGeom>
+            <a:solidFill>
+              <a:srgbClr val="00B050"/>
+            </a:solidFill>
+            <a:ln>
+              <a:solidFill>
+                <a:schemeClr val="accent6">
+                  <a:lumMod val="75000"/>
+                </a:schemeClr>
+              </a:solidFill>
+            </a:ln>
+          </p:spPr>
+          <p:style>
+            <a:lnRef idx="2">
+              <a:schemeClr val="accent1">
+                <a:shade val="50000"/>
+              </a:schemeClr>
+            </a:lnRef>
+            <a:fillRef idx="1">
+              <a:schemeClr val="accent1"/>
+            </a:fillRef>
+            <a:effectRef idx="0">
+              <a:schemeClr val="accent1"/>
+            </a:effectRef>
+            <a:fontRef idx="minor">
+              <a:schemeClr val="lt1"/>
+            </a:fontRef>
+          </p:style>
+          <p:txBody>
+            <a:bodyPr rtlCol="0" anchor="ctr"/>
+            <a:lstStyle/>
+            <a:p>
+              <a:pPr algn="ctr"/>
+              <a:endParaRPr lang="en-US"/>
+            </a:p>
+          </p:txBody>
+        </p:sp>
+        <p:sp>
+          <p:nvSpPr>
+            <p:cNvPr id="19" name="Flecha: hacia abajo 18">
+              <a:extLst>
+                <a:ext uri="{FF2B5EF4-FFF2-40B4-BE49-F238E27FC236}">
+                  <a16:creationId xmlns:a16="http://schemas.microsoft.com/office/drawing/2014/main" id="{5E88F09F-DC7C-95C1-2484-7FB97F9F4486}"/>
+                </a:ext>
+              </a:extLst>
+            </p:cNvPr>
+            <p:cNvSpPr/>
+            <p:nvPr/>
+          </p:nvSpPr>
+          <p:spPr>
+            <a:xfrm>
+              <a:off x="9645610" y="5311181"/>
               <a:ext cx="161261" cy="192522"/>
             </a:xfrm>
             <a:prstGeom prst="downArrow">

</xml_diff>